<commit_message>
update final report with repo reference
</commit_message>
<xml_diff>
--- a/release/Genetic Programming_v3.pptx
+++ b/release/Genetic Programming_v3.pptx
@@ -126,7 +126,7 @@
   </p:defaultTextStyle>
   <p:extLst>
     <p:ext uri="{EFAFB233-063F-42B5-8137-9DF3F51BA10A}">
-      <p15:sldGuideLst xmlns:p15="http://schemas.microsoft.com/office/powerpoint/2012/main" xmlns="">
+      <p15:sldGuideLst xmlns="" xmlns:p15="http://schemas.microsoft.com/office/powerpoint/2012/main">
         <p15:guide id="1" orient="horz" pos="2160">
           <p15:clr>
             <a:srgbClr val="A4A3A4"/>
@@ -5880,7 +5880,12 @@
             <p:ph type="title"/>
           </p:nvPr>
         </p:nvSpPr>
-        <p:spPr/>
+        <p:spPr>
+          <a:xfrm>
+            <a:off x="762000" y="152400"/>
+            <a:ext cx="7543800" cy="1450757"/>
+          </a:xfrm>
+        </p:spPr>
         <p:txBody>
           <a:bodyPr>
             <a:normAutofit/>
@@ -5905,10 +5910,15 @@
             <p:ph idx="1"/>
           </p:nvPr>
         </p:nvSpPr>
-        <p:spPr/>
+        <p:spPr>
+          <a:xfrm>
+            <a:off x="304800" y="1524000"/>
+            <a:ext cx="8061960" cy="4116494"/>
+          </a:xfrm>
+        </p:spPr>
         <p:txBody>
           <a:bodyPr>
-            <a:normAutofit fontScale="40000" lnSpcReduction="20000"/>
+            <a:normAutofit fontScale="25000" lnSpcReduction="20000"/>
           </a:bodyPr>
           <a:lstStyle/>
           <a:p>
@@ -5920,178 +5930,235 @@
           <a:p>
             <a:pPr lvl="0"/>
             <a:r>
-              <a:rPr lang="en-US" b="1" dirty="0"/>
+              <a:rPr lang="en-US" sz="3600" b="1" dirty="0"/>
               <a:t>Information used requirement analysis</a:t>
             </a:r>
-            <a:endParaRPr lang="en-US" dirty="0"/>
-          </a:p>
-          <a:p>
-            <a:r>
-              <a:rPr lang="en-US" dirty="0" smtClean="0"/>
+            <a:endParaRPr lang="en-US" sz="3600" dirty="0"/>
+          </a:p>
+          <a:p>
+            <a:r>
+              <a:rPr lang="en-US" sz="3600" dirty="0" smtClean="0"/>
               <a:t>Software </a:t>
             </a:r>
             <a:r>
-              <a:rPr lang="en-US" dirty="0"/>
+              <a:rPr lang="en-US" sz="3600" dirty="0"/>
               <a:t>Engineering Theory and Practice, Fourth Edition</a:t>
             </a:r>
           </a:p>
           <a:p>
             <a:r>
-              <a:rPr lang="en-US" dirty="0"/>
+              <a:rPr lang="en-US" sz="3600" dirty="0"/>
               <a:t>Author: Shari Lawrence </a:t>
             </a:r>
             <a:r>
-              <a:rPr lang="en-US" dirty="0" err="1"/>
+              <a:rPr lang="en-US" sz="3600" dirty="0" err="1"/>
               <a:t>Pfleeger</a:t>
             </a:r>
             <a:r>
-              <a:rPr lang="en-US" dirty="0"/>
+              <a:rPr lang="en-US" sz="3600" dirty="0"/>
               <a:t>, Joanne M. Atlee</a:t>
             </a:r>
           </a:p>
           <a:p>
             <a:pPr lvl="0"/>
             <a:r>
-              <a:rPr lang="en-US" b="1" dirty="0"/>
+              <a:rPr lang="en-US" sz="3600" b="1" dirty="0"/>
               <a:t>Information used for the design and development of the genetic operators.</a:t>
             </a:r>
-            <a:endParaRPr lang="en-US" dirty="0"/>
-          </a:p>
-          <a:p>
-            <a:r>
-              <a:rPr lang="en-US" dirty="0" smtClean="0"/>
+            <a:endParaRPr lang="en-US" sz="3600" dirty="0"/>
+          </a:p>
+          <a:p>
+            <a:r>
+              <a:rPr lang="en-US" sz="3600" dirty="0" smtClean="0"/>
               <a:t>The </a:t>
             </a:r>
             <a:r>
-              <a:rPr lang="en-US" dirty="0"/>
+              <a:rPr lang="en-US" sz="3600" dirty="0"/>
               <a:t>GP Tutorial. (1996-2013). [Online]. Available: http://www.geneticprogramming.com/Tutorial/</a:t>
             </a:r>
           </a:p>
           <a:p>
             <a:pPr lvl="0"/>
             <a:r>
-              <a:rPr lang="en-US" b="1" dirty="0"/>
+              <a:rPr lang="en-US" sz="3600" b="1" dirty="0"/>
               <a:t>Information used for the design and development of the genetic operators.</a:t>
             </a:r>
-            <a:endParaRPr lang="en-US" dirty="0"/>
-          </a:p>
-          <a:p>
-            <a:r>
-              <a:rPr lang="en-US" dirty="0" smtClean="0"/>
+            <a:endParaRPr lang="en-US" sz="3600" dirty="0"/>
+          </a:p>
+          <a:p>
+            <a:r>
+              <a:rPr lang="en-US" sz="3600" dirty="0" smtClean="0"/>
               <a:t>Kevin </a:t>
             </a:r>
             <a:r>
-              <a:rPr lang="en-US" dirty="0"/>
+              <a:rPr lang="en-US" sz="3600" dirty="0"/>
               <a:t>Dolan. (2009). "Selection." </a:t>
             </a:r>
             <a:r>
-              <a:rPr lang="en-US" i="1" dirty="0"/>
+              <a:rPr lang="en-US" sz="3600" i="1" dirty="0"/>
               <a:t>Genetic Programming Source</a:t>
             </a:r>
             <a:r>
-              <a:rPr lang="en-US" dirty="0"/>
+              <a:rPr lang="en-US" sz="3600" dirty="0"/>
               <a:t>. [Online]. Available:</a:t>
             </a:r>
           </a:p>
           <a:p>
             <a:r>
-              <a:rPr lang="en-US" dirty="0"/>
+              <a:rPr lang="en-US" sz="3600" dirty="0"/>
               <a:t>http://geneticprogramming.us/Selection.html</a:t>
             </a:r>
           </a:p>
           <a:p>
             <a:pPr lvl="0"/>
             <a:r>
-              <a:rPr lang="en-US" b="1" dirty="0"/>
+              <a:rPr lang="en-US" sz="3600" b="1" dirty="0"/>
               <a:t>Information used for the design and development of the genetic operators.</a:t>
             </a:r>
-            <a:endParaRPr lang="en-US" dirty="0"/>
+            <a:endParaRPr lang="en-US" sz="3600" dirty="0"/>
           </a:p>
           <a:p>
             <a:pPr hangingPunct="0"/>
             <a:r>
-              <a:rPr lang="en-US" dirty="0" smtClean="0"/>
+              <a:rPr lang="en-US" sz="3600" dirty="0" smtClean="0"/>
               <a:t>The </a:t>
             </a:r>
             <a:r>
-              <a:rPr lang="en-US" dirty="0"/>
+              <a:rPr lang="en-US" sz="3600" dirty="0"/>
               <a:t>Java Tutorial. (19995-2013). Lesson: Algorithms. [Online]. Available:</a:t>
             </a:r>
           </a:p>
           <a:p>
             <a:pPr hangingPunct="0"/>
             <a:r>
-              <a:rPr lang="en-US" dirty="0">
+              <a:rPr lang="en-US" sz="3600" dirty="0">
                 <a:hlinkClick r:id="rId2"/>
               </a:rPr>
               <a:t>http://docs.oracle.com/javase/tutorial/collections/algorithms/#</a:t>
             </a:r>
             <a:r>
-              <a:rPr lang="en-US" dirty="0" smtClean="0">
+              <a:rPr lang="en-US" sz="3600" dirty="0" smtClean="0">
                 <a:hlinkClick r:id="rId2"/>
               </a:rPr>
               <a:t>sorting</a:t>
             </a:r>
-            <a:endParaRPr lang="en-US" dirty="0" smtClean="0"/>
-          </a:p>
-          <a:p>
-            <a:r>
-              <a:rPr lang="en-US" b="1" smtClean="0"/>
+            <a:endParaRPr lang="en-US" sz="3600" dirty="0" smtClean="0"/>
+          </a:p>
+          <a:p>
+            <a:r>
+              <a:rPr lang="en-US" sz="3600" b="1" dirty="0" smtClean="0"/>
               <a:t>Information </a:t>
             </a:r>
             <a:r>
-              <a:rPr lang="en-US" b="1" dirty="0"/>
+              <a:rPr lang="en-US" sz="3600" b="1" dirty="0"/>
               <a:t>about Java Metrics </a:t>
             </a:r>
-            <a:endParaRPr lang="en-US" dirty="0"/>
-          </a:p>
-          <a:p>
-            <a:r>
-              <a:rPr lang="en-US" dirty="0" err="1"/>
+            <a:endParaRPr lang="en-US" sz="3600" dirty="0"/>
+          </a:p>
+          <a:p>
+            <a:r>
+              <a:rPr lang="en-US" sz="3600" dirty="0" err="1"/>
               <a:t>Aivosto</a:t>
             </a:r>
             <a:r>
-              <a:rPr lang="en-US" dirty="0"/>
+              <a:rPr lang="en-US" sz="3600" dirty="0"/>
               <a:t>, and Thomas </a:t>
             </a:r>
             <a:r>
-              <a:rPr lang="en-US" dirty="0" err="1"/>
+              <a:rPr lang="en-US" sz="3600" dirty="0" err="1"/>
               <a:t>Salste</a:t>
             </a:r>
             <a:r>
-              <a:rPr lang="en-US" dirty="0"/>
+              <a:rPr lang="en-US" sz="3600" dirty="0"/>
               <a:t>. “</a:t>
             </a:r>
             <a:r>
-              <a:rPr lang="en-US" dirty="0" err="1"/>
+              <a:rPr lang="en-US" sz="3600" dirty="0" err="1"/>
               <a:t>Aivosto</a:t>
             </a:r>
             <a:r>
-              <a:rPr lang="en-US" dirty="0"/>
+              <a:rPr lang="en-US" sz="3600" dirty="0"/>
               <a:t>” -Programming Tools for Software </a:t>
             </a:r>
           </a:p>
           <a:p>
             <a:r>
-              <a:rPr lang="en-US" dirty="0"/>
+              <a:rPr lang="en-US" sz="3600" dirty="0"/>
               <a:t>Developers.” </a:t>
             </a:r>
             <a:r>
-              <a:rPr lang="en-US" dirty="0" err="1"/>
+              <a:rPr lang="en-US" sz="3600" dirty="0" err="1"/>
               <a:t>Aivosto</a:t>
             </a:r>
             <a:r>
-              <a:rPr lang="en-US" dirty="0"/>
+              <a:rPr lang="en-US" sz="3600" dirty="0"/>
               <a:t>. </a:t>
             </a:r>
             <a:r>
-              <a:rPr lang="en-US" dirty="0" err="1"/>
+              <a:rPr lang="en-US" sz="3600" dirty="0" err="1"/>
               <a:t>N.p</a:t>
             </a:r>
             <a:r>
-              <a:rPr lang="en-US" dirty="0"/>
+              <a:rPr lang="en-US" sz="3600" dirty="0"/>
               <a:t>., 1997. Web. 08 May 2015 </a:t>
             </a:r>
+            <a:endParaRPr lang="en-US" sz="3600" dirty="0" smtClean="0"/>
+          </a:p>
+          <a:p>
+            <a:r>
+              <a:rPr lang="en-US" sz="3600" b="1" dirty="0" smtClean="0"/>
+              <a:t>Information </a:t>
+            </a:r>
+            <a:r>
+              <a:rPr lang="en-US" sz="3600" b="1" dirty="0"/>
+              <a:t>about </a:t>
+            </a:r>
+            <a:r>
+              <a:rPr lang="en-US" sz="3600" b="1" dirty="0" smtClean="0"/>
+              <a:t>Generic </a:t>
+            </a:r>
+            <a:r>
+              <a:rPr lang="en-US" sz="3600" b="1" dirty="0"/>
+              <a:t>Programming Environment</a:t>
+            </a:r>
+            <a:endParaRPr lang="en-US" sz="3600" dirty="0"/>
+          </a:p>
+          <a:p>
+            <a:r>
+              <a:rPr lang="en-US" sz="3600" dirty="0"/>
+              <a:t> </a:t>
+            </a:r>
+            <a:r>
+              <a:rPr lang="en-US" sz="3600" dirty="0" err="1"/>
+              <a:t>GitRepo</a:t>
+            </a:r>
+            <a:r>
+              <a:rPr lang="en-US" sz="3600" dirty="0"/>
+              <a:t>: </a:t>
+            </a:r>
+            <a:r>
+              <a:rPr lang="en-US" sz="3600" u="sng" dirty="0">
+                <a:hlinkClick r:id="rId3"/>
+              </a:rPr>
+              <a:t>https://github.com/jnaithani/genetic-programming</a:t>
+            </a:r>
+            <a:endParaRPr lang="en-US" sz="3600" dirty="0"/>
+          </a:p>
+          <a:p>
+            <a:r>
+              <a:rPr lang="en-US" sz="3600" dirty="0"/>
+              <a:t>Mohammed </a:t>
+            </a:r>
+            <a:r>
+              <a:rPr lang="en-US" sz="3600" dirty="0" err="1"/>
+              <a:t>Alsaihati</a:t>
+            </a:r>
+            <a:r>
+              <a:rPr lang="en-US" sz="3600" dirty="0"/>
+              <a:t> and others, Sept 2013</a:t>
+            </a:r>
+          </a:p>
+          <a:p>
             <a:endParaRPr lang="en-US" dirty="0"/>
           </a:p>
           <a:p>
@@ -7430,7 +7497,7 @@
   <a:extraClrSchemeLst/>
   <a:extLst>
     <a:ext uri="{05A4C25C-085E-4340-85A3-A5531E510DB2}">
-      <thm15:themeFamily xmlns:thm15="http://schemas.microsoft.com/office/thememl/2012/main" xmlns="" name="Retrospect" id="{5F128B03-DCCA-4EEB-AB3B-CF2899314A46}" vid="{3F1AAB62-24C6-49D2-8E01-B56FAC9A3DCD}"/>
+      <thm15:themeFamily xmlns="" xmlns:thm15="http://schemas.microsoft.com/office/thememl/2012/main" name="Retrospect" id="{5F128B03-DCCA-4EEB-AB3B-CF2899314A46}" vid="{3F1AAB62-24C6-49D2-8E01-B56FAC9A3DCD}"/>
     </a:ext>
   </a:extLst>
 </a:theme>

</xml_diff>